<commit_message>
No changes, just seems to be
</commit_message>
<xml_diff>
--- a/Admin and Documentation/Radio Systems.pptx
+++ b/Admin and Documentation/Radio Systems.pptx
@@ -4277,6 +4277,126 @@
           </a:prstGeom>
         </p:spPr>
       </p:pic>
+      <p:pic>
+        <p:nvPicPr>
+          <p:cNvPr id="17" name="Picture 16"/>
+          <p:cNvPicPr>
+            <a:picLocks noChangeAspect="1"/>
+          </p:cNvPicPr>
+          <p:nvPr/>
+        </p:nvPicPr>
+        <p:blipFill>
+          <a:blip r:embed="rId7"/>
+          <a:stretch>
+            <a:fillRect/>
+          </a:stretch>
+        </p:blipFill>
+        <p:spPr>
+          <a:xfrm>
+            <a:off x="3331817" y="755650"/>
+            <a:ext cx="1168400" cy="5346700"/>
+          </a:xfrm>
+          <a:prstGeom prst="rect">
+            <a:avLst/>
+          </a:prstGeom>
+        </p:spPr>
+      </p:pic>
+      <p:pic>
+        <p:nvPicPr>
+          <p:cNvPr id="19" name="Picture 18"/>
+          <p:cNvPicPr>
+            <a:picLocks noChangeAspect="1"/>
+          </p:cNvPicPr>
+          <p:nvPr/>
+        </p:nvPicPr>
+        <p:blipFill>
+          <a:blip r:embed="rId8"/>
+          <a:stretch>
+            <a:fillRect/>
+          </a:stretch>
+        </p:blipFill>
+        <p:spPr>
+          <a:xfrm>
+            <a:off x="1599095" y="755650"/>
+            <a:ext cx="1752600" cy="5346700"/>
+          </a:xfrm>
+          <a:prstGeom prst="rect">
+            <a:avLst/>
+          </a:prstGeom>
+        </p:spPr>
+      </p:pic>
+      <p:pic>
+        <p:nvPicPr>
+          <p:cNvPr id="21" name="Picture 20"/>
+          <p:cNvPicPr>
+            <a:picLocks noChangeAspect="1"/>
+          </p:cNvPicPr>
+          <p:nvPr/>
+        </p:nvPicPr>
+        <p:blipFill>
+          <a:blip r:embed="rId9"/>
+          <a:stretch>
+            <a:fillRect/>
+          </a:stretch>
+        </p:blipFill>
+        <p:spPr>
+          <a:xfrm>
+            <a:off x="4500217" y="781050"/>
+            <a:ext cx="2235200" cy="5321300"/>
+          </a:xfrm>
+          <a:prstGeom prst="rect">
+            <a:avLst/>
+          </a:prstGeom>
+        </p:spPr>
+      </p:pic>
+      <p:pic>
+        <p:nvPicPr>
+          <p:cNvPr id="23" name="Picture 22"/>
+          <p:cNvPicPr>
+            <a:picLocks noChangeAspect="1"/>
+          </p:cNvPicPr>
+          <p:nvPr/>
+        </p:nvPicPr>
+        <p:blipFill>
+          <a:blip r:embed="rId10"/>
+          <a:stretch>
+            <a:fillRect/>
+          </a:stretch>
+        </p:blipFill>
+        <p:spPr>
+          <a:xfrm>
+            <a:off x="6635474" y="755650"/>
+            <a:ext cx="2260600" cy="1727200"/>
+          </a:xfrm>
+          <a:prstGeom prst="rect">
+            <a:avLst/>
+          </a:prstGeom>
+        </p:spPr>
+      </p:pic>
+      <p:pic>
+        <p:nvPicPr>
+          <p:cNvPr id="25" name="Picture 24"/>
+          <p:cNvPicPr>
+            <a:picLocks noChangeAspect="1"/>
+          </p:cNvPicPr>
+          <p:nvPr/>
+        </p:nvPicPr>
+        <p:blipFill>
+          <a:blip r:embed="rId11"/>
+          <a:stretch>
+            <a:fillRect/>
+          </a:stretch>
+        </p:blipFill>
+        <p:spPr>
+          <a:xfrm>
+            <a:off x="6800574" y="2406276"/>
+            <a:ext cx="2095500" cy="3632200"/>
+          </a:xfrm>
+          <a:prstGeom prst="rect">
+            <a:avLst/>
+          </a:prstGeom>
+        </p:spPr>
+      </p:pic>
     </p:spTree>
     <p:extLst>
       <p:ext uri="{BB962C8B-B14F-4D97-AF65-F5344CB8AC3E}">

</xml_diff>

<commit_message>
Changes to slide show
</commit_message>
<xml_diff>
--- a/Admin and Documentation/Radio Systems.pptx
+++ b/Admin and Documentation/Radio Systems.pptx
@@ -23,6 +23,12 @@
     <p:sldId id="273" r:id="rId17"/>
     <p:sldId id="271" r:id="rId18"/>
     <p:sldId id="270" r:id="rId19"/>
+    <p:sldId id="274" r:id="rId20"/>
+    <p:sldId id="275" r:id="rId21"/>
+    <p:sldId id="276" r:id="rId22"/>
+    <p:sldId id="277" r:id="rId23"/>
+    <p:sldId id="278" r:id="rId24"/>
+    <p:sldId id="279" r:id="rId25"/>
   </p:sldIdLst>
   <p:sldSz cx="12192000" cy="6858000"/>
   <p:notesSz cx="6858000" cy="9144000"/>
@@ -297,7 +303,7 @@
           <a:p>
             <a:fld id="{9E016143-E03C-4CFD-AFDC-14E5BDEA754C}" type="datetimeFigureOut">
               <a:rPr lang="en-US" dirty="0"/>
-              <a:t>3/20/2017</a:t>
+              <a:t>3/21/2017</a:t>
             </a:fld>
             <a:endParaRPr lang="en-US" dirty="0"/>
           </a:p>
@@ -521,7 +527,7 @@
           <a:p>
             <a:fld id="{C033E54A-A8CA-48C1-9504-691B58049D29}" type="datetimeFigureOut">
               <a:rPr lang="en-US" dirty="0"/>
-              <a:t>3/20/2017</a:t>
+              <a:t>3/21/2017</a:t>
             </a:fld>
             <a:endParaRPr lang="en-US" dirty="0"/>
           </a:p>
@@ -696,7 +702,7 @@
           <a:p>
             <a:fld id="{B5F6C806-BBF7-471C-9527-881CE2266695}" type="datetimeFigureOut">
               <a:rPr lang="en-US" dirty="0"/>
-              <a:t>3/20/2017</a:t>
+              <a:t>3/21/2017</a:t>
             </a:fld>
             <a:endParaRPr lang="en-US" dirty="0"/>
           </a:p>
@@ -861,7 +867,7 @@
           <a:p>
             <a:fld id="{78C94063-DF36-4330-A365-08DA1FA5B7D6}" type="datetimeFigureOut">
               <a:rPr lang="en-US" dirty="0"/>
-              <a:t>3/20/2017</a:t>
+              <a:t>3/21/2017</a:t>
             </a:fld>
             <a:endParaRPr lang="en-US" dirty="0"/>
           </a:p>
@@ -1110,7 +1116,7 @@
           <a:p>
             <a:fld id="{908A7C6C-0F39-4D70-8E8D-FE5B9C95FA73}" type="datetimeFigureOut">
               <a:rPr lang="en-US" dirty="0"/>
-              <a:t>3/20/2017</a:t>
+              <a:t>3/21/2017</a:t>
             </a:fld>
             <a:endParaRPr lang="en-US" dirty="0"/>
           </a:p>
@@ -1431,7 +1437,7 @@
           <a:p>
             <a:fld id="{DFCFA4AC-08CC-42CE-BD01-C191750A04EC}" type="datetimeFigureOut">
               <a:rPr lang="en-US" dirty="0"/>
-              <a:t>3/20/2017</a:t>
+              <a:t>3/21/2017</a:t>
             </a:fld>
             <a:endParaRPr lang="en-US" dirty="0"/>
           </a:p>
@@ -1877,7 +1883,7 @@
           <a:p>
             <a:fld id="{1BA7A723-92A7-435B-B681-F25B092FEFEB}" type="datetimeFigureOut">
               <a:rPr lang="en-US" dirty="0"/>
-              <a:t>3/20/2017</a:t>
+              <a:t>3/21/2017</a:t>
             </a:fld>
             <a:endParaRPr lang="en-US" dirty="0"/>
           </a:p>
@@ -1990,7 +1996,7 @@
           <a:p>
             <a:fld id="{4F170639-886C-4FCF-9EAB-ABB5DA3F3F4A}" type="datetimeFigureOut">
               <a:rPr lang="en-US" dirty="0"/>
-              <a:t>3/20/2017</a:t>
+              <a:t>3/21/2017</a:t>
             </a:fld>
             <a:endParaRPr lang="en-US" dirty="0"/>
           </a:p>
@@ -2080,7 +2086,7 @@
           <a:p>
             <a:fld id="{22230651-31F4-45D2-98AE-A2108F41BC07}" type="datetimeFigureOut">
               <a:rPr lang="en-US" dirty="0"/>
-              <a:t>3/20/2017</a:t>
+              <a:t>3/21/2017</a:t>
             </a:fld>
             <a:endParaRPr lang="en-US" dirty="0"/>
           </a:p>
@@ -2362,7 +2368,7 @@
           <a:p>
             <a:fld id="{6F53789A-C914-4DB1-8815-80B5EC7335C5}" type="datetimeFigureOut">
               <a:rPr lang="en-US" dirty="0"/>
-              <a:t>3/20/2017</a:t>
+              <a:t>3/21/2017</a:t>
             </a:fld>
             <a:endParaRPr lang="en-US" dirty="0"/>
           </a:p>
@@ -2576,10 +2582,9 @@
           </a:lstStyle>
           <a:p>
             <a:r>
-              <a:rPr lang="en-US"/>
+              <a:rPr lang="en-US" dirty="0"/>
               <a:t>Click icon to add picture</a:t>
             </a:r>
-            <a:endParaRPr lang="en-US" dirty="0"/>
           </a:p>
         </p:txBody>
       </p:sp>
@@ -2679,7 +2684,7 @@
           <a:p>
             <a:fld id="{5E6440AA-91A0-436F-8FDB-C0F939DCAE21}" type="datetimeFigureOut">
               <a:rPr lang="en-US" dirty="0"/>
-              <a:t>3/20/2017</a:t>
+              <a:t>3/21/2017</a:t>
             </a:fld>
             <a:endParaRPr lang="en-US" dirty="0"/>
           </a:p>
@@ -2928,7 +2933,7 @@
           <a:p>
             <a:fld id="{0E59FD0C-5451-4CA0-86AF-E70AE3279989}" type="datetimeFigureOut">
               <a:rPr lang="en-US" dirty="0"/>
-              <a:t>3/20/2017</a:t>
+              <a:t>3/21/2017</a:t>
             </a:fld>
             <a:endParaRPr lang="en-US" dirty="0"/>
           </a:p>
@@ -5203,6 +5208,305 @@
 </p:sld>
 </file>
 
+<file path=ppt/slides/slide19.xml><?xml version="1.0" encoding="utf-8"?>
+<p:sld xmlns:a="http://schemas.openxmlformats.org/drawingml/2006/main" xmlns:r="http://schemas.openxmlformats.org/officeDocument/2006/relationships" xmlns:p="http://schemas.openxmlformats.org/presentationml/2006/main">
+  <p:cSld>
+    <p:spTree>
+      <p:nvGrpSpPr>
+        <p:cNvPr id="1" name=""/>
+        <p:cNvGrpSpPr/>
+        <p:nvPr/>
+      </p:nvGrpSpPr>
+      <p:grpSpPr>
+        <a:xfrm>
+          <a:off x="0" y="0"/>
+          <a:ext cx="0" cy="0"/>
+          <a:chOff x="0" y="0"/>
+          <a:chExt cx="0" cy="0"/>
+        </a:xfrm>
+      </p:grpSpPr>
+      <p:pic>
+        <p:nvPicPr>
+          <p:cNvPr id="3" name="Picture 2"/>
+          <p:cNvPicPr>
+            <a:picLocks noChangeAspect="1"/>
+          </p:cNvPicPr>
+          <p:nvPr/>
+        </p:nvPicPr>
+        <p:blipFill>
+          <a:blip r:embed="rId2"/>
+          <a:stretch>
+            <a:fillRect/>
+          </a:stretch>
+        </p:blipFill>
+        <p:spPr>
+          <a:xfrm>
+            <a:off x="989507" y="2967335"/>
+            <a:ext cx="2381250" cy="2381250"/>
+          </a:xfrm>
+          <a:prstGeom prst="rect">
+            <a:avLst/>
+          </a:prstGeom>
+        </p:spPr>
+      </p:pic>
+      <p:pic>
+        <p:nvPicPr>
+          <p:cNvPr id="5" name="Picture 4"/>
+          <p:cNvPicPr>
+            <a:picLocks noChangeAspect="1"/>
+          </p:cNvPicPr>
+          <p:nvPr/>
+        </p:nvPicPr>
+        <p:blipFill>
+          <a:blip r:embed="rId3"/>
+          <a:stretch>
+            <a:fillRect/>
+          </a:stretch>
+        </p:blipFill>
+        <p:spPr>
+          <a:xfrm>
+            <a:off x="7639724" y="2967335"/>
+            <a:ext cx="2319438" cy="2302412"/>
+          </a:xfrm>
+          <a:prstGeom prst="rect">
+            <a:avLst/>
+          </a:prstGeom>
+        </p:spPr>
+      </p:pic>
+      <p:sp>
+        <p:nvSpPr>
+          <p:cNvPr id="6" name="Arrow: Right 5"/>
+          <p:cNvSpPr/>
+          <p:nvPr/>
+        </p:nvSpPr>
+        <p:spPr>
+          <a:xfrm>
+            <a:off x="4184510" y="3099428"/>
+            <a:ext cx="2645456" cy="889475"/>
+          </a:xfrm>
+          <a:prstGeom prst="rightArrow">
+            <a:avLst/>
+          </a:prstGeom>
+          <a:solidFill>
+            <a:srgbClr val="FFFF00"/>
+          </a:solidFill>
+        </p:spPr>
+        <p:style>
+          <a:lnRef idx="2">
+            <a:schemeClr val="accent1">
+              <a:shade val="50000"/>
+            </a:schemeClr>
+          </a:lnRef>
+          <a:fillRef idx="1">
+            <a:schemeClr val="accent1"/>
+          </a:fillRef>
+          <a:effectRef idx="0">
+            <a:schemeClr val="accent1"/>
+          </a:effectRef>
+          <a:fontRef idx="minor">
+            <a:schemeClr val="lt1"/>
+          </a:fontRef>
+        </p:style>
+        <p:txBody>
+          <a:bodyPr rtlCol="0" anchor="ctr"/>
+          <a:lstStyle/>
+          <a:p>
+            <a:pPr algn="ctr"/>
+            <a:endParaRPr lang="en-US"/>
+          </a:p>
+        </p:txBody>
+      </p:sp>
+      <p:sp>
+        <p:nvSpPr>
+          <p:cNvPr id="7" name="Arrow: Left 6"/>
+          <p:cNvSpPr/>
+          <p:nvPr/>
+        </p:nvSpPr>
+        <p:spPr>
+          <a:xfrm>
+            <a:off x="4008363" y="4540202"/>
+            <a:ext cx="2817608" cy="808383"/>
+          </a:xfrm>
+          <a:prstGeom prst="leftArrow">
+            <a:avLst/>
+          </a:prstGeom>
+          <a:solidFill>
+            <a:srgbClr val="FFFF00"/>
+          </a:solidFill>
+        </p:spPr>
+        <p:style>
+          <a:lnRef idx="2">
+            <a:schemeClr val="accent1">
+              <a:shade val="50000"/>
+            </a:schemeClr>
+          </a:lnRef>
+          <a:fillRef idx="1">
+            <a:schemeClr val="accent1"/>
+          </a:fillRef>
+          <a:effectRef idx="0">
+            <a:schemeClr val="accent1"/>
+          </a:effectRef>
+          <a:fontRef idx="minor">
+            <a:schemeClr val="lt1"/>
+          </a:fontRef>
+        </p:style>
+        <p:txBody>
+          <a:bodyPr rtlCol="0" anchor="ctr"/>
+          <a:lstStyle/>
+          <a:p>
+            <a:pPr algn="ctr"/>
+            <a:endParaRPr lang="en-US"/>
+          </a:p>
+        </p:txBody>
+      </p:sp>
+      <p:sp>
+        <p:nvSpPr>
+          <p:cNvPr id="8" name="Rectangle 7"/>
+          <p:cNvSpPr/>
+          <p:nvPr/>
+        </p:nvSpPr>
+        <p:spPr>
+          <a:xfrm>
+            <a:off x="6003634" y="2967335"/>
+            <a:ext cx="184731" cy="923330"/>
+          </a:xfrm>
+          <a:prstGeom prst="rect">
+            <a:avLst/>
+          </a:prstGeom>
+          <a:noFill/>
+        </p:spPr>
+        <p:txBody>
+          <a:bodyPr wrap="none" lIns="91440" tIns="45720" rIns="91440" bIns="45720">
+            <a:spAutoFit/>
+          </a:bodyPr>
+          <a:lstStyle/>
+          <a:p>
+            <a:pPr algn="ctr"/>
+            <a:endParaRPr lang="en-US" sz="5400" b="1" cap="none" spc="0" dirty="0">
+              <a:ln w="9525">
+                <a:solidFill>
+                  <a:schemeClr val="bg1"/>
+                </a:solidFill>
+                <a:prstDash val="solid"/>
+              </a:ln>
+              <a:solidFill>
+                <a:schemeClr val="tx1"/>
+              </a:solidFill>
+              <a:effectLst>
+                <a:outerShdw blurRad="12700" dist="38100" dir="2700000" algn="tl" rotWithShape="0">
+                  <a:schemeClr val="bg1">
+                    <a:lumMod val="50000"/>
+                  </a:schemeClr>
+                </a:outerShdw>
+              </a:effectLst>
+            </a:endParaRPr>
+          </a:p>
+        </p:txBody>
+      </p:sp>
+      <p:sp>
+        <p:nvSpPr>
+          <p:cNvPr id="9" name="Rectangle 8"/>
+          <p:cNvSpPr/>
+          <p:nvPr/>
+        </p:nvSpPr>
+        <p:spPr>
+          <a:xfrm>
+            <a:off x="2398643" y="622852"/>
+            <a:ext cx="6400800" cy="923330"/>
+          </a:xfrm>
+          <a:prstGeom prst="rect">
+            <a:avLst/>
+          </a:prstGeom>
+        </p:spPr>
+        <p:txBody>
+          <a:bodyPr wrap="square">
+            <a:spAutoFit/>
+          </a:bodyPr>
+          <a:lstStyle/>
+          <a:p>
+            <a:pPr algn="ctr"/>
+            <a:r>
+              <a:rPr lang="en-US" sz="5400" b="1" dirty="0">
+                <a:ln w="9525">
+                  <a:solidFill>
+                    <a:schemeClr val="bg1"/>
+                  </a:solidFill>
+                  <a:prstDash val="solid"/>
+                </a:ln>
+                <a:effectLst>
+                  <a:outerShdw blurRad="12700" dist="38100" dir="2700000" algn="tl" rotWithShape="0">
+                    <a:schemeClr val="bg1">
+                      <a:lumMod val="50000"/>
+                    </a:schemeClr>
+                  </a:outerShdw>
+                </a:effectLst>
+              </a:rPr>
+              <a:t>Data Flow</a:t>
+            </a:r>
+          </a:p>
+        </p:txBody>
+      </p:sp>
+      <p:pic>
+        <p:nvPicPr>
+          <p:cNvPr id="11" name="Picture 10"/>
+          <p:cNvPicPr>
+            <a:picLocks noChangeAspect="1"/>
+          </p:cNvPicPr>
+          <p:nvPr/>
+        </p:nvPicPr>
+        <p:blipFill>
+          <a:blip r:embed="rId4"/>
+          <a:stretch>
+            <a:fillRect/>
+          </a:stretch>
+        </p:blipFill>
+        <p:spPr>
+          <a:xfrm>
+            <a:off x="4822116" y="2328154"/>
+            <a:ext cx="991249" cy="991249"/>
+          </a:xfrm>
+          <a:prstGeom prst="rect">
+            <a:avLst/>
+          </a:prstGeom>
+        </p:spPr>
+      </p:pic>
+      <p:pic>
+        <p:nvPicPr>
+          <p:cNvPr id="12" name="Picture 11"/>
+          <p:cNvPicPr>
+            <a:picLocks noChangeAspect="1"/>
+          </p:cNvPicPr>
+          <p:nvPr/>
+        </p:nvPicPr>
+        <p:blipFill>
+          <a:blip r:embed="rId5"/>
+          <a:stretch>
+            <a:fillRect/>
+          </a:stretch>
+        </p:blipFill>
+        <p:spPr>
+          <a:xfrm>
+            <a:off x="4819631" y="5269747"/>
+            <a:ext cx="993734" cy="993734"/>
+          </a:xfrm>
+          <a:prstGeom prst="rect">
+            <a:avLst/>
+          </a:prstGeom>
+        </p:spPr>
+      </p:pic>
+    </p:spTree>
+    <p:extLst>
+      <p:ext uri="{BB962C8B-B14F-4D97-AF65-F5344CB8AC3E}">
+        <p14:creationId xmlns:p14="http://schemas.microsoft.com/office/powerpoint/2010/main" val="2555257398"/>
+      </p:ext>
+    </p:extLst>
+  </p:cSld>
+  <p:clrMapOvr>
+    <a:masterClrMapping/>
+  </p:clrMapOvr>
+</p:sld>
+</file>
+
 <file path=ppt/slides/slide2.xml><?xml version="1.0" encoding="utf-8"?>
 <p:sld xmlns:a="http://schemas.openxmlformats.org/drawingml/2006/main" xmlns:r="http://schemas.openxmlformats.org/officeDocument/2006/relationships" xmlns:p="http://schemas.openxmlformats.org/presentationml/2006/main">
   <p:cSld>
@@ -5268,6 +5572,629 @@
     <p:extLst>
       <p:ext uri="{BB962C8B-B14F-4D97-AF65-F5344CB8AC3E}">
         <p14:creationId xmlns:p14="http://schemas.microsoft.com/office/powerpoint/2010/main" val="119116191"/>
+      </p:ext>
+    </p:extLst>
+  </p:cSld>
+  <p:clrMapOvr>
+    <a:masterClrMapping/>
+  </p:clrMapOvr>
+</p:sld>
+</file>
+
+<file path=ppt/slides/slide20.xml><?xml version="1.0" encoding="utf-8"?>
+<p:sld xmlns:a="http://schemas.openxmlformats.org/drawingml/2006/main" xmlns:r="http://schemas.openxmlformats.org/officeDocument/2006/relationships" xmlns:p="http://schemas.openxmlformats.org/presentationml/2006/main">
+  <p:cSld>
+    <p:spTree>
+      <p:nvGrpSpPr>
+        <p:cNvPr id="1" name=""/>
+        <p:cNvGrpSpPr/>
+        <p:nvPr/>
+      </p:nvGrpSpPr>
+      <p:grpSpPr>
+        <a:xfrm>
+          <a:off x="0" y="0"/>
+          <a:ext cx="0" cy="0"/>
+          <a:chOff x="0" y="0"/>
+          <a:chExt cx="0" cy="0"/>
+        </a:xfrm>
+      </p:grpSpPr>
+      <p:pic>
+        <p:nvPicPr>
+          <p:cNvPr id="5" name="Picture 4"/>
+          <p:cNvPicPr>
+            <a:picLocks noChangeAspect="1"/>
+          </p:cNvPicPr>
+          <p:nvPr/>
+        </p:nvPicPr>
+        <p:blipFill>
+          <a:blip r:embed="rId2"/>
+          <a:stretch>
+            <a:fillRect/>
+          </a:stretch>
+        </p:blipFill>
+        <p:spPr>
+          <a:xfrm>
+            <a:off x="7901736" y="362125"/>
+            <a:ext cx="2067567" cy="1565148"/>
+          </a:xfrm>
+          <a:prstGeom prst="rect">
+            <a:avLst/>
+          </a:prstGeom>
+        </p:spPr>
+      </p:pic>
+      <p:sp>
+        <p:nvSpPr>
+          <p:cNvPr id="6" name="Rectangle 5"/>
+          <p:cNvSpPr/>
+          <p:nvPr/>
+        </p:nvSpPr>
+        <p:spPr>
+          <a:xfrm>
+            <a:off x="2244014" y="581943"/>
+            <a:ext cx="4788491" cy="923330"/>
+          </a:xfrm>
+          <a:prstGeom prst="rect">
+            <a:avLst/>
+          </a:prstGeom>
+          <a:noFill/>
+        </p:spPr>
+        <p:txBody>
+          <a:bodyPr wrap="none" lIns="91440" tIns="45720" rIns="91440" bIns="45720">
+            <a:spAutoFit/>
+          </a:bodyPr>
+          <a:lstStyle/>
+          <a:p>
+            <a:pPr algn="ctr"/>
+            <a:r>
+              <a:rPr lang="en-US" sz="5400" b="1" dirty="0">
+                <a:ln w="9525">
+                  <a:solidFill>
+                    <a:schemeClr val="bg1"/>
+                  </a:solidFill>
+                  <a:prstDash val="solid"/>
+                </a:ln>
+                <a:effectLst>
+                  <a:outerShdw blurRad="12700" dist="38100" dir="2700000" algn="tl" rotWithShape="0">
+                    <a:schemeClr val="bg1">
+                      <a:lumMod val="50000"/>
+                    </a:schemeClr>
+                  </a:outerShdw>
+                </a:effectLst>
+              </a:rPr>
+              <a:t>Architecture</a:t>
+            </a:r>
+            <a:endParaRPr lang="en-US" sz="5400" b="1" cap="none" spc="0" dirty="0">
+              <a:ln w="9525">
+                <a:solidFill>
+                  <a:schemeClr val="bg1"/>
+                </a:solidFill>
+                <a:prstDash val="solid"/>
+              </a:ln>
+              <a:solidFill>
+                <a:schemeClr val="tx1"/>
+              </a:solidFill>
+              <a:effectLst>
+                <a:outerShdw blurRad="12700" dist="38100" dir="2700000" algn="tl" rotWithShape="0">
+                  <a:schemeClr val="bg1">
+                    <a:lumMod val="50000"/>
+                  </a:schemeClr>
+                </a:outerShdw>
+              </a:effectLst>
+            </a:endParaRPr>
+          </a:p>
+        </p:txBody>
+      </p:sp>
+      <p:pic>
+        <p:nvPicPr>
+          <p:cNvPr id="8" name="Picture 7"/>
+          <p:cNvPicPr>
+            <a:picLocks noChangeAspect="1"/>
+          </p:cNvPicPr>
+          <p:nvPr/>
+        </p:nvPicPr>
+        <p:blipFill>
+          <a:blip r:embed="rId3"/>
+          <a:stretch>
+            <a:fillRect/>
+          </a:stretch>
+        </p:blipFill>
+        <p:spPr>
+          <a:xfrm>
+            <a:off x="2244014" y="2395393"/>
+            <a:ext cx="5238067" cy="3906049"/>
+          </a:xfrm>
+          <a:prstGeom prst="rect">
+            <a:avLst/>
+          </a:prstGeom>
+        </p:spPr>
+      </p:pic>
+    </p:spTree>
+    <p:extLst>
+      <p:ext uri="{BB962C8B-B14F-4D97-AF65-F5344CB8AC3E}">
+        <p14:creationId xmlns:p14="http://schemas.microsoft.com/office/powerpoint/2010/main" val="1758591770"/>
+      </p:ext>
+    </p:extLst>
+  </p:cSld>
+  <p:clrMapOvr>
+    <a:masterClrMapping/>
+  </p:clrMapOvr>
+</p:sld>
+</file>
+
+<file path=ppt/slides/slide21.xml><?xml version="1.0" encoding="utf-8"?>
+<p:sld xmlns:a="http://schemas.openxmlformats.org/drawingml/2006/main" xmlns:r="http://schemas.openxmlformats.org/officeDocument/2006/relationships" xmlns:p="http://schemas.openxmlformats.org/presentationml/2006/main">
+  <p:cSld>
+    <p:spTree>
+      <p:nvGrpSpPr>
+        <p:cNvPr id="1" name=""/>
+        <p:cNvGrpSpPr/>
+        <p:nvPr/>
+      </p:nvGrpSpPr>
+      <p:grpSpPr>
+        <a:xfrm>
+          <a:off x="0" y="0"/>
+          <a:ext cx="0" cy="0"/>
+          <a:chOff x="0" y="0"/>
+          <a:chExt cx="0" cy="0"/>
+        </a:xfrm>
+      </p:grpSpPr>
+      <p:pic>
+        <p:nvPicPr>
+          <p:cNvPr id="2" name="Picture 1"/>
+          <p:cNvPicPr>
+            <a:picLocks noChangeAspect="1"/>
+          </p:cNvPicPr>
+          <p:nvPr/>
+        </p:nvPicPr>
+        <p:blipFill>
+          <a:blip r:embed="rId2"/>
+          <a:stretch>
+            <a:fillRect/>
+          </a:stretch>
+        </p:blipFill>
+        <p:spPr>
+          <a:xfrm>
+            <a:off x="3636943" y="2206236"/>
+            <a:ext cx="3840813" cy="3145809"/>
+          </a:xfrm>
+          <a:prstGeom prst="rect">
+            <a:avLst/>
+          </a:prstGeom>
+        </p:spPr>
+      </p:pic>
+      <p:sp>
+        <p:nvSpPr>
+          <p:cNvPr id="4" name="Rectangle 3"/>
+          <p:cNvSpPr/>
+          <p:nvPr/>
+        </p:nvSpPr>
+        <p:spPr>
+          <a:xfrm>
+            <a:off x="1693889" y="740970"/>
+            <a:ext cx="7300209" cy="923330"/>
+          </a:xfrm>
+          <a:prstGeom prst="rect">
+            <a:avLst/>
+          </a:prstGeom>
+          <a:noFill/>
+        </p:spPr>
+        <p:txBody>
+          <a:bodyPr wrap="square" lIns="91440" tIns="45720" rIns="91440" bIns="45720">
+            <a:spAutoFit/>
+          </a:bodyPr>
+          <a:lstStyle/>
+          <a:p>
+            <a:pPr algn="ctr"/>
+            <a:r>
+              <a:rPr lang="en-US" sz="5400" b="1" cap="none" spc="0" dirty="0">
+                <a:ln w="9525">
+                  <a:solidFill>
+                    <a:schemeClr val="bg1"/>
+                  </a:solidFill>
+                  <a:prstDash val="solid"/>
+                </a:ln>
+                <a:solidFill>
+                  <a:schemeClr val="tx1"/>
+                </a:solidFill>
+                <a:effectLst>
+                  <a:outerShdw blurRad="12700" dist="38100" dir="2700000" algn="tl" rotWithShape="0">
+                    <a:schemeClr val="bg1">
+                      <a:lumMod val="50000"/>
+                    </a:schemeClr>
+                  </a:outerShdw>
+                </a:effectLst>
+              </a:rPr>
+              <a:t>Incoming File</a:t>
+            </a:r>
+          </a:p>
+        </p:txBody>
+      </p:sp>
+    </p:spTree>
+    <p:extLst>
+      <p:ext uri="{BB962C8B-B14F-4D97-AF65-F5344CB8AC3E}">
+        <p14:creationId xmlns:p14="http://schemas.microsoft.com/office/powerpoint/2010/main" val="4225749043"/>
+      </p:ext>
+    </p:extLst>
+  </p:cSld>
+  <p:clrMapOvr>
+    <a:masterClrMapping/>
+  </p:clrMapOvr>
+</p:sld>
+</file>
+
+<file path=ppt/slides/slide22.xml><?xml version="1.0" encoding="utf-8"?>
+<p:sld xmlns:a="http://schemas.openxmlformats.org/drawingml/2006/main" xmlns:r="http://schemas.openxmlformats.org/officeDocument/2006/relationships" xmlns:p="http://schemas.openxmlformats.org/presentationml/2006/main">
+  <p:cSld>
+    <p:spTree>
+      <p:nvGrpSpPr>
+        <p:cNvPr id="1" name=""/>
+        <p:cNvGrpSpPr/>
+        <p:nvPr/>
+      </p:nvGrpSpPr>
+      <p:grpSpPr>
+        <a:xfrm>
+          <a:off x="0" y="0"/>
+          <a:ext cx="0" cy="0"/>
+          <a:chOff x="0" y="0"/>
+          <a:chExt cx="0" cy="0"/>
+        </a:xfrm>
+      </p:grpSpPr>
+      <p:pic>
+        <p:nvPicPr>
+          <p:cNvPr id="2" name="Picture 1"/>
+          <p:cNvPicPr>
+            <a:picLocks noChangeAspect="1"/>
+          </p:cNvPicPr>
+          <p:nvPr/>
+        </p:nvPicPr>
+        <p:blipFill>
+          <a:blip r:embed="rId2"/>
+          <a:stretch>
+            <a:fillRect/>
+          </a:stretch>
+        </p:blipFill>
+        <p:spPr>
+          <a:xfrm>
+            <a:off x="1274860" y="1075471"/>
+            <a:ext cx="7990448" cy="4530850"/>
+          </a:xfrm>
+          <a:prstGeom prst="rect">
+            <a:avLst/>
+          </a:prstGeom>
+        </p:spPr>
+      </p:pic>
+      <p:pic>
+        <p:nvPicPr>
+          <p:cNvPr id="3" name="Picture 2"/>
+          <p:cNvPicPr>
+            <a:picLocks noChangeAspect="1"/>
+          </p:cNvPicPr>
+          <p:nvPr/>
+        </p:nvPicPr>
+        <p:blipFill>
+          <a:blip r:embed="rId3"/>
+          <a:stretch>
+            <a:fillRect/>
+          </a:stretch>
+        </p:blipFill>
+        <p:spPr>
+          <a:xfrm>
+            <a:off x="723331" y="4982818"/>
+            <a:ext cx="10037434" cy="997110"/>
+          </a:xfrm>
+          <a:prstGeom prst="rect">
+            <a:avLst/>
+          </a:prstGeom>
+        </p:spPr>
+      </p:pic>
+      <p:sp>
+        <p:nvSpPr>
+          <p:cNvPr id="4" name="Rectangle 3"/>
+          <p:cNvSpPr/>
+          <p:nvPr/>
+        </p:nvSpPr>
+        <p:spPr>
+          <a:xfrm rot="2579281">
+            <a:off x="5601949" y="1301915"/>
+            <a:ext cx="4346160" cy="923330"/>
+          </a:xfrm>
+          <a:prstGeom prst="rect">
+            <a:avLst/>
+          </a:prstGeom>
+          <a:noFill/>
+        </p:spPr>
+        <p:txBody>
+          <a:bodyPr wrap="square" lIns="91440" tIns="45720" rIns="91440" bIns="45720">
+            <a:spAutoFit/>
+          </a:bodyPr>
+          <a:lstStyle/>
+          <a:p>
+            <a:pPr algn="ctr"/>
+            <a:r>
+              <a:rPr lang="en-US" sz="5400" b="1" dirty="0">
+                <a:ln w="9525">
+                  <a:solidFill>
+                    <a:schemeClr val="bg1"/>
+                  </a:solidFill>
+                  <a:prstDash val="solid"/>
+                </a:ln>
+                <a:effectLst>
+                  <a:outerShdw blurRad="12700" dist="38100" dir="2700000" algn="tl" rotWithShape="0">
+                    <a:schemeClr val="bg1">
+                      <a:lumMod val="50000"/>
+                    </a:schemeClr>
+                  </a:outerShdw>
+                </a:effectLst>
+              </a:rPr>
+              <a:t>Code</a:t>
+            </a:r>
+            <a:endParaRPr lang="en-US" sz="5400" b="1" cap="none" spc="0" dirty="0">
+              <a:ln w="9525">
+                <a:solidFill>
+                  <a:schemeClr val="bg1"/>
+                </a:solidFill>
+                <a:prstDash val="solid"/>
+              </a:ln>
+              <a:solidFill>
+                <a:schemeClr val="tx1"/>
+              </a:solidFill>
+              <a:effectLst>
+                <a:outerShdw blurRad="12700" dist="38100" dir="2700000" algn="tl" rotWithShape="0">
+                  <a:schemeClr val="bg1">
+                    <a:lumMod val="50000"/>
+                  </a:schemeClr>
+                </a:outerShdw>
+              </a:effectLst>
+            </a:endParaRPr>
+          </a:p>
+        </p:txBody>
+      </p:sp>
+    </p:spTree>
+    <p:extLst>
+      <p:ext uri="{BB962C8B-B14F-4D97-AF65-F5344CB8AC3E}">
+        <p14:creationId xmlns:p14="http://schemas.microsoft.com/office/powerpoint/2010/main" val="2055736847"/>
+      </p:ext>
+    </p:extLst>
+  </p:cSld>
+  <p:clrMapOvr>
+    <a:masterClrMapping/>
+  </p:clrMapOvr>
+</p:sld>
+</file>
+
+<file path=ppt/slides/slide23.xml><?xml version="1.0" encoding="utf-8"?>
+<p:sld xmlns:a="http://schemas.openxmlformats.org/drawingml/2006/main" xmlns:r="http://schemas.openxmlformats.org/officeDocument/2006/relationships" xmlns:p="http://schemas.openxmlformats.org/presentationml/2006/main">
+  <p:cSld>
+    <p:spTree>
+      <p:nvGrpSpPr>
+        <p:cNvPr id="1" name=""/>
+        <p:cNvGrpSpPr/>
+        <p:nvPr/>
+      </p:nvGrpSpPr>
+      <p:grpSpPr>
+        <a:xfrm>
+          <a:off x="0" y="0"/>
+          <a:ext cx="0" cy="0"/>
+          <a:chOff x="0" y="0"/>
+          <a:chExt cx="0" cy="0"/>
+        </a:xfrm>
+      </p:grpSpPr>
+      <p:sp>
+        <p:nvSpPr>
+          <p:cNvPr id="2" name="Rectangle 1"/>
+          <p:cNvSpPr/>
+          <p:nvPr/>
+        </p:nvSpPr>
+        <p:spPr>
+          <a:xfrm>
+            <a:off x="2663686" y="1571535"/>
+            <a:ext cx="6480313" cy="4247317"/>
+          </a:xfrm>
+          <a:prstGeom prst="rect">
+            <a:avLst/>
+          </a:prstGeom>
+        </p:spPr>
+        <p:txBody>
+          <a:bodyPr wrap="square">
+            <a:spAutoFit/>
+          </a:bodyPr>
+          <a:lstStyle/>
+          <a:p>
+            <a:r>
+              <a:rPr lang="en-US" dirty="0"/>
+              <a:t>{</a:t>
+            </a:r>
+          </a:p>
+          <a:p>
+            <a:r>
+              <a:rPr lang="en-US" dirty="0"/>
+              <a:t>    "FirstName": "John",</a:t>
+            </a:r>
+          </a:p>
+          <a:p>
+            <a:r>
+              <a:rPr lang="en-US" dirty="0"/>
+              <a:t>    "LastName": "Smith",</a:t>
+            </a:r>
+          </a:p>
+          <a:p>
+            <a:r>
+              <a:rPr lang="en-US" dirty="0"/>
+              <a:t>    "ReferredBy": "Me",</a:t>
+            </a:r>
+          </a:p>
+          <a:p>
+            <a:r>
+              <a:rPr lang="en-US" dirty="0"/>
+              <a:t>    "Address": "1313 Hummningbirdbird Lane",</a:t>
+            </a:r>
+          </a:p>
+          <a:p>
+            <a:r>
+              <a:rPr lang="en-US" dirty="0"/>
+              <a:t>    "City": "Destin",</a:t>
+            </a:r>
+          </a:p>
+          <a:p>
+            <a:r>
+              <a:rPr lang="en-US" dirty="0"/>
+              <a:t>    "State": "FL",</a:t>
+            </a:r>
+          </a:p>
+          <a:p>
+            <a:r>
+              <a:rPr lang="en-US" dirty="0"/>
+              <a:t>    "Zip": "37932",</a:t>
+            </a:r>
+          </a:p>
+          <a:p>
+            <a:r>
+              <a:rPr lang="en-US" dirty="0"/>
+              <a:t>    "HomePhone": "865-555-5555",</a:t>
+            </a:r>
+          </a:p>
+          <a:p>
+            <a:r>
+              <a:rPr lang="en-US" dirty="0"/>
+              <a:t>    "</a:t>
+            </a:r>
+            <a:r>
+              <a:rPr lang="en-US" dirty="0" err="1"/>
+              <a:t>CellPhone</a:t>
+            </a:r>
+            <a:r>
+              <a:rPr lang="en-US" dirty="0"/>
+              <a:t>": "555-555-5555",</a:t>
+            </a:r>
+          </a:p>
+          <a:p>
+            <a:r>
+              <a:rPr lang="en-US" dirty="0"/>
+              <a:t>    "Email": "me@my.com",</a:t>
+            </a:r>
+          </a:p>
+          <a:p>
+            <a:r>
+              <a:rPr lang="en-US" dirty="0"/>
+              <a:t>    "PetName1": "Lassie",</a:t>
+            </a:r>
+          </a:p>
+          <a:p>
+            <a:r>
+              <a:rPr lang="en-US" dirty="0"/>
+              <a:t>    "PetBreed1": "Collie",</a:t>
+            </a:r>
+          </a:p>
+          <a:p>
+            <a:r>
+              <a:rPr lang="en-US" dirty="0"/>
+              <a:t>    "PetAge1": "5"</a:t>
+            </a:r>
+          </a:p>
+          <a:p>
+            <a:r>
+              <a:rPr lang="en-US" dirty="0"/>
+              <a:t>  },</a:t>
+            </a:r>
+          </a:p>
+        </p:txBody>
+      </p:sp>
+      <p:sp>
+        <p:nvSpPr>
+          <p:cNvPr id="3" name="Rectangle 2"/>
+          <p:cNvSpPr/>
+          <p:nvPr/>
+        </p:nvSpPr>
+        <p:spPr>
+          <a:xfrm>
+            <a:off x="3511826" y="648205"/>
+            <a:ext cx="3262953" cy="923330"/>
+          </a:xfrm>
+          <a:prstGeom prst="rect">
+            <a:avLst/>
+          </a:prstGeom>
+          <a:noFill/>
+        </p:spPr>
+        <p:txBody>
+          <a:bodyPr wrap="square" lIns="91440" tIns="45720" rIns="91440" bIns="45720">
+            <a:spAutoFit/>
+          </a:bodyPr>
+          <a:lstStyle/>
+          <a:p>
+            <a:pPr algn="ctr"/>
+            <a:r>
+              <a:rPr lang="en-US" sz="5400" b="1" dirty="0">
+                <a:ln w="9525">
+                  <a:solidFill>
+                    <a:schemeClr val="bg1"/>
+                  </a:solidFill>
+                  <a:prstDash val="solid"/>
+                </a:ln>
+                <a:effectLst>
+                  <a:outerShdw blurRad="12700" dist="38100" dir="2700000" algn="tl" rotWithShape="0">
+                    <a:schemeClr val="bg1">
+                      <a:lumMod val="50000"/>
+                    </a:schemeClr>
+                  </a:outerShdw>
+                </a:effectLst>
+              </a:rPr>
+              <a:t>Output</a:t>
+            </a:r>
+            <a:endParaRPr lang="en-US" sz="5400" b="1" cap="none" spc="0" dirty="0">
+              <a:ln w="9525">
+                <a:solidFill>
+                  <a:schemeClr val="bg1"/>
+                </a:solidFill>
+                <a:prstDash val="solid"/>
+              </a:ln>
+              <a:solidFill>
+                <a:schemeClr val="tx1"/>
+              </a:solidFill>
+              <a:effectLst>
+                <a:outerShdw blurRad="12700" dist="38100" dir="2700000" algn="tl" rotWithShape="0">
+                  <a:schemeClr val="bg1">
+                    <a:lumMod val="50000"/>
+                  </a:schemeClr>
+                </a:outerShdw>
+              </a:effectLst>
+            </a:endParaRPr>
+          </a:p>
+        </p:txBody>
+      </p:sp>
+    </p:spTree>
+    <p:extLst>
+      <p:ext uri="{BB962C8B-B14F-4D97-AF65-F5344CB8AC3E}">
+        <p14:creationId xmlns:p14="http://schemas.microsoft.com/office/powerpoint/2010/main" val="1500012750"/>
+      </p:ext>
+    </p:extLst>
+  </p:cSld>
+  <p:clrMapOvr>
+    <a:masterClrMapping/>
+  </p:clrMapOvr>
+</p:sld>
+</file>
+
+<file path=ppt/slides/slide24.xml><?xml version="1.0" encoding="utf-8"?>
+<p:sld xmlns:a="http://schemas.openxmlformats.org/drawingml/2006/main" xmlns:r="http://schemas.openxmlformats.org/officeDocument/2006/relationships" xmlns:p="http://schemas.openxmlformats.org/presentationml/2006/main">
+  <p:cSld>
+    <p:spTree>
+      <p:nvGrpSpPr>
+        <p:cNvPr id="1" name=""/>
+        <p:cNvGrpSpPr/>
+        <p:nvPr/>
+      </p:nvGrpSpPr>
+      <p:grpSpPr>
+        <a:xfrm>
+          <a:off x="0" y="0"/>
+          <a:ext cx="0" cy="0"/>
+          <a:chOff x="0" y="0"/>
+          <a:chExt cx="0" cy="0"/>
+        </a:xfrm>
+      </p:grpSpPr>
+    </p:spTree>
+    <p:extLst>
+      <p:ext uri="{BB962C8B-B14F-4D97-AF65-F5344CB8AC3E}">
+        <p14:creationId xmlns:p14="http://schemas.microsoft.com/office/powerpoint/2010/main" val="2781810486"/>
       </p:ext>
     </p:extLst>
   </p:cSld>
@@ -6048,13 +6975,13 @@
   <p:clrMapOvr>
     <a:masterClrMapping/>
   </p:clrMapOvr>
-  <mc:AlternateContent xmlns:mc="http://schemas.openxmlformats.org/markup-compatibility/2006">
-    <mc:Choice xmlns:p159="http://schemas.microsoft.com/office/powerpoint/2015/09/main" Requires="p159">
+  <mc:AlternateContent xmlns:mc="http://schemas.openxmlformats.org/markup-compatibility/2006" xmlns:p159="http://schemas.microsoft.com/office/powerpoint/2015/09/main">
+    <mc:Choice Requires="p159">
       <p:transition xmlns:p14="http://schemas.microsoft.com/office/powerpoint/2010/main" spd="slow" p14:dur="2000" advTm="0">
         <p159:morph option="byObject"/>
       </p:transition>
     </mc:Choice>
-    <mc:Fallback>
+    <mc:Fallback xmlns="">
       <p:transition spd="slow" advTm="0">
         <p:fade/>
       </p:transition>

</xml_diff>